<commit_message>
Adressess changed to agh domain
</commit_message>
<xml_diff>
--- a/Lab02.pptx
+++ b/Lab02.pptx
@@ -3115,7 +3115,7 @@
           </a:ln>
           <a:extLst>
             <a:ext uri="{C572A759-6A51-4108-AA02-DFA0A04FC94B}">
-              <ma14:wrappingTextBoxFlag xmlns="" xmlns:m="http://schemas.openxmlformats.org/officeDocument/2006/math" xmlns:a14="http://schemas.microsoft.com/office/drawing/2010/main" xmlns:ma14="http://schemas.microsoft.com/office/mac/drawingml/2011/main" val="1"/>
+              <ma14:wrappingTextBoxFlag xmlns:ma14="http://schemas.microsoft.com/office/mac/drawingml/2011/main" xmlns:a14="http://schemas.microsoft.com/office/drawing/2010/main" xmlns:m="http://schemas.openxmlformats.org/officeDocument/2006/math" xmlns="" val="1"/>
             </a:ext>
           </a:extLst>
         </p:spPr>
@@ -3154,7 +3154,7 @@
           </a:ln>
           <a:extLst>
             <a:ext uri="{C572A759-6A51-4108-AA02-DFA0A04FC94B}">
-              <ma14:wrappingTextBoxFlag xmlns="" xmlns:m="http://schemas.openxmlformats.org/officeDocument/2006/math" xmlns:a14="http://schemas.microsoft.com/office/drawing/2010/main" xmlns:ma14="http://schemas.microsoft.com/office/mac/drawingml/2011/main" val="1"/>
+              <ma14:wrappingTextBoxFlag xmlns:ma14="http://schemas.microsoft.com/office/mac/drawingml/2011/main" xmlns:a14="http://schemas.microsoft.com/office/drawing/2010/main" xmlns:m="http://schemas.openxmlformats.org/officeDocument/2006/math" xmlns="" val="1"/>
             </a:ext>
           </a:extLst>
         </p:spPr>
@@ -4018,7 +4018,7 @@
           </a:ln>
           <a:extLst>
             <a:ext uri="{C572A759-6A51-4108-AA02-DFA0A04FC94B}">
-              <ma14:wrappingTextBoxFlag xmlns="" xmlns:m="http://schemas.openxmlformats.org/officeDocument/2006/math" xmlns:a14="http://schemas.microsoft.com/office/drawing/2010/main" xmlns:ma14="http://schemas.microsoft.com/office/mac/drawingml/2011/main" val="1"/>
+              <ma14:wrappingTextBoxFlag xmlns:ma14="http://schemas.microsoft.com/office/mac/drawingml/2011/main" xmlns:a14="http://schemas.microsoft.com/office/drawing/2010/main" xmlns:m="http://schemas.openxmlformats.org/officeDocument/2006/math" xmlns="" val="1"/>
             </a:ext>
           </a:extLst>
         </p:spPr>
@@ -4058,7 +4058,7 @@
           </a:ln>
           <a:extLst>
             <a:ext uri="{C572A759-6A51-4108-AA02-DFA0A04FC94B}">
-              <ma14:wrappingTextBoxFlag xmlns="" xmlns:m="http://schemas.openxmlformats.org/officeDocument/2006/math" xmlns:a14="http://schemas.microsoft.com/office/drawing/2010/main" xmlns:ma14="http://schemas.microsoft.com/office/mac/drawingml/2011/main" val="1"/>
+              <ma14:wrappingTextBoxFlag xmlns:ma14="http://schemas.microsoft.com/office/mac/drawingml/2011/main" xmlns:a14="http://schemas.microsoft.com/office/drawing/2010/main" xmlns:m="http://schemas.openxmlformats.org/officeDocument/2006/math" xmlns="" val="1"/>
             </a:ext>
           </a:extLst>
         </p:spPr>
@@ -4101,7 +4101,7 @@
           </a:ln>
           <a:extLst>
             <a:ext uri="{C572A759-6A51-4108-AA02-DFA0A04FC94B}">
-              <ma14:wrappingTextBoxFlag xmlns="" xmlns:m="http://schemas.openxmlformats.org/officeDocument/2006/math" xmlns:a14="http://schemas.microsoft.com/office/drawing/2010/main" xmlns:ma14="http://schemas.microsoft.com/office/mac/drawingml/2011/main" val="1"/>
+              <ma14:wrappingTextBoxFlag xmlns:ma14="http://schemas.microsoft.com/office/mac/drawingml/2011/main" xmlns:a14="http://schemas.microsoft.com/office/drawing/2010/main" xmlns:m="http://schemas.openxmlformats.org/officeDocument/2006/math" xmlns="" val="1"/>
             </a:ext>
           </a:extLst>
         </p:spPr>
@@ -4160,7 +4160,7 @@
           </a:ln>
           <a:extLst>
             <a:ext uri="{C572A759-6A51-4108-AA02-DFA0A04FC94B}">
-              <ma14:wrappingTextBoxFlag xmlns="" xmlns:m="http://schemas.openxmlformats.org/officeDocument/2006/math" xmlns:a14="http://schemas.microsoft.com/office/drawing/2010/main" xmlns:ma14="http://schemas.microsoft.com/office/mac/drawingml/2011/main" val="1"/>
+              <ma14:wrappingTextBoxFlag xmlns:ma14="http://schemas.microsoft.com/office/mac/drawingml/2011/main" xmlns:a14="http://schemas.microsoft.com/office/drawing/2010/main" xmlns:m="http://schemas.openxmlformats.org/officeDocument/2006/math" xmlns="" val="1"/>
             </a:ext>
           </a:extLst>
         </p:spPr>
@@ -4531,7 +4531,7 @@
           </a:ln>
           <a:extLst>
             <a:ext uri="{C572A759-6A51-4108-AA02-DFA0A04FC94B}">
-              <ma14:wrappingTextBoxFlag xmlns="" xmlns:m="http://schemas.openxmlformats.org/officeDocument/2006/math" xmlns:a14="http://schemas.microsoft.com/office/drawing/2010/main" xmlns:ma14="http://schemas.microsoft.com/office/mac/drawingml/2011/main" val="1"/>
+              <ma14:wrappingTextBoxFlag xmlns:ma14="http://schemas.microsoft.com/office/mac/drawingml/2011/main" xmlns:a14="http://schemas.microsoft.com/office/drawing/2010/main" xmlns:m="http://schemas.openxmlformats.org/officeDocument/2006/math" xmlns="" val="1"/>
             </a:ext>
           </a:extLst>
         </p:spPr>
@@ -4737,7 +4737,7 @@
           </a:ln>
           <a:extLst>
             <a:ext uri="{C572A759-6A51-4108-AA02-DFA0A04FC94B}">
-              <ma14:wrappingTextBoxFlag xmlns="" xmlns:m="http://schemas.openxmlformats.org/officeDocument/2006/math" xmlns:a14="http://schemas.microsoft.com/office/drawing/2010/main" xmlns:ma14="http://schemas.microsoft.com/office/mac/drawingml/2011/main" val="1"/>
+              <ma14:wrappingTextBoxFlag xmlns:ma14="http://schemas.microsoft.com/office/mac/drawingml/2011/main" xmlns:a14="http://schemas.microsoft.com/office/drawing/2010/main" xmlns:m="http://schemas.openxmlformats.org/officeDocument/2006/math" xmlns="" val="1"/>
             </a:ext>
           </a:extLst>
         </p:spPr>
@@ -4911,7 +4911,7 @@
           </a:ln>
           <a:extLst>
             <a:ext uri="{C572A759-6A51-4108-AA02-DFA0A04FC94B}">
-              <ma14:wrappingTextBoxFlag xmlns="" xmlns:m="http://schemas.openxmlformats.org/officeDocument/2006/math" xmlns:a14="http://schemas.microsoft.com/office/drawing/2010/main" xmlns:ma14="http://schemas.microsoft.com/office/mac/drawingml/2011/main" val="1"/>
+              <ma14:wrappingTextBoxFlag xmlns:ma14="http://schemas.microsoft.com/office/mac/drawingml/2011/main" xmlns:a14="http://schemas.microsoft.com/office/drawing/2010/main" xmlns:m="http://schemas.openxmlformats.org/officeDocument/2006/math" xmlns="" val="1"/>
             </a:ext>
           </a:extLst>
         </p:spPr>

</xml_diff>